<commit_message>
Update Diagrams, remove Architecture diagram from Diagrams.pptx
</commit_message>
<xml_diff>
--- a/docs/diagrams/ArchitectureDiagram.pptx
+++ b/docs/diagrams/ArchitectureDiagram.pptx
@@ -3692,101 +3692,6 @@
       </p:sp>
       <p:sp>
         <p:nvSpPr>
-          <p:cNvPr id="51" name="Cloud 50"/>
-          <p:cNvSpPr/>
-          <p:nvPr/>
-        </p:nvSpPr>
-        <p:spPr>
-          <a:xfrm>
-            <a:off x="4174069" y="1447800"/>
-            <a:ext cx="914400" cy="533400"/>
-          </a:xfrm>
-          <a:prstGeom prst="cloud">
-            <a:avLst/>
-          </a:prstGeom>
-          <a:solidFill>
-            <a:schemeClr val="bg1"/>
-          </a:solidFill>
-          <a:ln>
-            <a:solidFill>
-              <a:schemeClr val="tx1"/>
-            </a:solidFill>
-          </a:ln>
-        </p:spPr>
-        <p:style>
-          <a:lnRef idx="2">
-            <a:schemeClr val="accent1">
-              <a:shade val="50000"/>
-            </a:schemeClr>
-          </a:lnRef>
-          <a:fillRef idx="1">
-            <a:schemeClr val="accent1"/>
-          </a:fillRef>
-          <a:effectRef idx="0">
-            <a:schemeClr val="accent1"/>
-          </a:effectRef>
-          <a:fontRef idx="minor">
-            <a:schemeClr val="lt1"/>
-          </a:fontRef>
-        </p:style>
-        <p:txBody>
-          <a:bodyPr rtlCol="0" anchor="ctr"/>
-          <a:lstStyle/>
-          <a:p>
-            <a:pPr algn="ctr"/>
-            <a:r>
-              <a:rPr lang="en-US" sz="1400" dirty="0">
-                <a:solidFill>
-                  <a:schemeClr val="tx1"/>
-                </a:solidFill>
-              </a:rPr>
-              <a:t>Web</a:t>
-            </a:r>
-          </a:p>
-        </p:txBody>
-      </p:sp>
-      <p:cxnSp>
-        <p:nvCxnSpPr>
-          <p:cNvPr id="52" name="Elbow Connector 51"/>
-          <p:cNvCxnSpPr>
-            <a:stCxn id="2" idx="0"/>
-            <a:endCxn id="51" idx="2"/>
-          </p:cNvCxnSpPr>
-          <p:nvPr/>
-        </p:nvCxnSpPr>
-        <p:spPr>
-          <a:xfrm rot="5400000" flipH="1" flipV="1">
-            <a:off x="3746648" y="1760923"/>
-            <a:ext cx="476678" cy="383835"/>
-          </a:xfrm>
-          <a:prstGeom prst="bentConnector2">
-            <a:avLst/>
-          </a:prstGeom>
-          <a:ln w="28575">
-            <a:solidFill>
-              <a:srgbClr val="00B050"/>
-            </a:solidFill>
-            <a:prstDash val="sysDot"/>
-            <a:tailEnd type="arrow"/>
-          </a:ln>
-        </p:spPr>
-        <p:style>
-          <a:lnRef idx="1">
-            <a:schemeClr val="accent1"/>
-          </a:lnRef>
-          <a:fillRef idx="0">
-            <a:schemeClr val="accent1"/>
-          </a:fillRef>
-          <a:effectRef idx="0">
-            <a:schemeClr val="accent1"/>
-          </a:effectRef>
-          <a:fontRef idx="minor">
-            <a:schemeClr val="tx1"/>
-          </a:fontRef>
-        </p:style>
-      </p:cxnSp>
-      <p:sp>
-        <p:nvSpPr>
           <p:cNvPr id="23" name="Rectangle 62"/>
           <p:cNvSpPr/>
           <p:nvPr/>

</xml_diff>

<commit_message>
Update Developer Guide and README
</commit_message>
<xml_diff>
--- a/docs/diagrams/ArchitectureDiagram.pptx
+++ b/docs/diagrams/ArchitectureDiagram.pptx
@@ -104,6 +104,11 @@
       </a:defRPr>
     </a:lvl9pPr>
   </p:defaultTextStyle>
+  <p:extLst>
+    <p:ext uri="{EFAFB233-063F-42B5-8137-9DF3F51BA10A}">
+      <p15:sldGuideLst xmlns:p15="http://schemas.microsoft.com/office/powerpoint/2012/main"/>
+    </p:ext>
+  </p:extLst>
 </p:presentation>
 </file>
 
@@ -238,7 +243,7 @@
           <a:p>
             <a:fld id="{BC206DEC-61E2-B144-B803-F5422B40234F}" type="datetimeFigureOut">
               <a:rPr lang="en-US" smtClean="0"/>
-              <a:t>10/23/16</a:t>
+              <a:t>11/7/16</a:t>
             </a:fld>
             <a:endParaRPr lang="en-US"/>
           </a:p>
@@ -408,7 +413,7 @@
           <a:p>
             <a:fld id="{BC206DEC-61E2-B144-B803-F5422B40234F}" type="datetimeFigureOut">
               <a:rPr lang="en-US" smtClean="0"/>
-              <a:t>10/23/16</a:t>
+              <a:t>11/7/16</a:t>
             </a:fld>
             <a:endParaRPr lang="en-US"/>
           </a:p>
@@ -588,7 +593,7 @@
           <a:p>
             <a:fld id="{BC206DEC-61E2-B144-B803-F5422B40234F}" type="datetimeFigureOut">
               <a:rPr lang="en-US" smtClean="0"/>
-              <a:t>10/23/16</a:t>
+              <a:t>11/7/16</a:t>
             </a:fld>
             <a:endParaRPr lang="en-US"/>
           </a:p>
@@ -758,7 +763,7 @@
           <a:p>
             <a:fld id="{BC206DEC-61E2-B144-B803-F5422B40234F}" type="datetimeFigureOut">
               <a:rPr lang="en-US" smtClean="0"/>
-              <a:t>10/23/16</a:t>
+              <a:t>11/7/16</a:t>
             </a:fld>
             <a:endParaRPr lang="en-US"/>
           </a:p>
@@ -1004,7 +1009,7 @@
           <a:p>
             <a:fld id="{BC206DEC-61E2-B144-B803-F5422B40234F}" type="datetimeFigureOut">
               <a:rPr lang="en-US" smtClean="0"/>
-              <a:t>10/23/16</a:t>
+              <a:t>11/7/16</a:t>
             </a:fld>
             <a:endParaRPr lang="en-US"/>
           </a:p>
@@ -1236,7 +1241,7 @@
           <a:p>
             <a:fld id="{BC206DEC-61E2-B144-B803-F5422B40234F}" type="datetimeFigureOut">
               <a:rPr lang="en-US" smtClean="0"/>
-              <a:t>10/23/16</a:t>
+              <a:t>11/7/16</a:t>
             </a:fld>
             <a:endParaRPr lang="en-US"/>
           </a:p>
@@ -1603,7 +1608,7 @@
           <a:p>
             <a:fld id="{BC206DEC-61E2-B144-B803-F5422B40234F}" type="datetimeFigureOut">
               <a:rPr lang="en-US" smtClean="0"/>
-              <a:t>10/23/16</a:t>
+              <a:t>11/7/16</a:t>
             </a:fld>
             <a:endParaRPr lang="en-US"/>
           </a:p>
@@ -1721,7 +1726,7 @@
           <a:p>
             <a:fld id="{BC206DEC-61E2-B144-B803-F5422B40234F}" type="datetimeFigureOut">
               <a:rPr lang="en-US" smtClean="0"/>
-              <a:t>10/23/16</a:t>
+              <a:t>11/7/16</a:t>
             </a:fld>
             <a:endParaRPr lang="en-US"/>
           </a:p>
@@ -1816,7 +1821,7 @@
           <a:p>
             <a:fld id="{BC206DEC-61E2-B144-B803-F5422B40234F}" type="datetimeFigureOut">
               <a:rPr lang="en-US" smtClean="0"/>
-              <a:t>10/23/16</a:t>
+              <a:t>11/7/16</a:t>
             </a:fld>
             <a:endParaRPr lang="en-US"/>
           </a:p>
@@ -2093,7 +2098,7 @@
           <a:p>
             <a:fld id="{BC206DEC-61E2-B144-B803-F5422B40234F}" type="datetimeFigureOut">
               <a:rPr lang="en-US" smtClean="0"/>
-              <a:t>10/23/16</a:t>
+              <a:t>11/7/16</a:t>
             </a:fld>
             <a:endParaRPr lang="en-US"/>
           </a:p>
@@ -2346,7 +2351,7 @@
           <a:p>
             <a:fld id="{BC206DEC-61E2-B144-B803-F5422B40234F}" type="datetimeFigureOut">
               <a:rPr lang="en-US" smtClean="0"/>
-              <a:t>10/23/16</a:t>
+              <a:t>11/7/16</a:t>
             </a:fld>
             <a:endParaRPr lang="en-US"/>
           </a:p>
@@ -2559,7 +2564,7 @@
           <a:p>
             <a:fld id="{BC206DEC-61E2-B144-B803-F5422B40234F}" type="datetimeFigureOut">
               <a:rPr lang="en-US" smtClean="0"/>
-              <a:t>10/23/16</a:t>
+              <a:t>11/7/16</a:t>
             </a:fld>
             <a:endParaRPr lang="en-US"/>
           </a:p>
@@ -4107,11 +4112,6 @@
               </a:rPr>
               <a:t>Center</a:t>
             </a:r>
-            <a:endParaRPr lang="en-US" sz="1600" dirty="0">
-              <a:solidFill>
-                <a:schemeClr val="bg1"/>
-              </a:solidFill>
-            </a:endParaRPr>
           </a:p>
         </p:txBody>
       </p:sp>
@@ -4177,6 +4177,141 @@
                 <a:lumMod val="75000"/>
               </a:schemeClr>
             </a:solidFill>
+          </a:ln>
+        </p:spPr>
+        <p:style>
+          <a:lnRef idx="1">
+            <a:schemeClr val="accent1"/>
+          </a:lnRef>
+          <a:fillRef idx="0">
+            <a:schemeClr val="accent1"/>
+          </a:fillRef>
+          <a:effectRef idx="0">
+            <a:schemeClr val="accent1"/>
+          </a:effectRef>
+          <a:fontRef idx="minor">
+            <a:schemeClr val="tx1"/>
+          </a:fontRef>
+        </p:style>
+      </p:cxnSp>
+      <p:sp>
+        <p:nvSpPr>
+          <p:cNvPr id="28" name="Cloud 27"/>
+          <p:cNvSpPr/>
+          <p:nvPr/>
+        </p:nvSpPr>
+        <p:spPr>
+          <a:xfrm>
+            <a:off x="4239685" y="1319106"/>
+            <a:ext cx="914400" cy="533400"/>
+          </a:xfrm>
+          <a:prstGeom prst="cloud">
+            <a:avLst/>
+          </a:prstGeom>
+          <a:solidFill>
+            <a:schemeClr val="bg1"/>
+          </a:solidFill>
+          <a:ln>
+            <a:solidFill>
+              <a:schemeClr val="tx1"/>
+            </a:solidFill>
+          </a:ln>
+        </p:spPr>
+        <p:style>
+          <a:lnRef idx="2">
+            <a:schemeClr val="accent1">
+              <a:shade val="50000"/>
+            </a:schemeClr>
+          </a:lnRef>
+          <a:fillRef idx="1">
+            <a:schemeClr val="accent1"/>
+          </a:fillRef>
+          <a:effectRef idx="0">
+            <a:schemeClr val="accent1"/>
+          </a:effectRef>
+          <a:fontRef idx="minor">
+            <a:schemeClr val="lt1"/>
+          </a:fontRef>
+        </p:style>
+        <p:txBody>
+          <a:bodyPr rtlCol="0" anchor="ctr"/>
+          <a:lstStyle/>
+          <a:p>
+            <a:pPr algn="ctr"/>
+            <a:r>
+              <a:rPr lang="en-US" sz="1400" dirty="0">
+                <a:solidFill>
+                  <a:schemeClr val="tx1"/>
+                </a:solidFill>
+              </a:rPr>
+              <a:t>Web</a:t>
+            </a:r>
+          </a:p>
+        </p:txBody>
+      </p:sp>
+      <p:cxnSp>
+        <p:nvCxnSpPr>
+          <p:cNvPr id="41" name="Elbow Connector 40"/>
+          <p:cNvCxnSpPr>
+            <a:stCxn id="2" idx="0"/>
+            <a:endCxn id="28" idx="2"/>
+          </p:cNvCxnSpPr>
+          <p:nvPr/>
+        </p:nvCxnSpPr>
+        <p:spPr>
+          <a:xfrm rot="5400000" flipH="1" flipV="1">
+            <a:off x="3715109" y="1663768"/>
+            <a:ext cx="605373" cy="449451"/>
+          </a:xfrm>
+          <a:prstGeom prst="bentConnector2">
+            <a:avLst/>
+          </a:prstGeom>
+          <a:ln w="28575">
+            <a:solidFill>
+              <a:srgbClr val="00B050"/>
+            </a:solidFill>
+            <a:prstDash val="sysDot"/>
+            <a:tailEnd type="arrow"/>
+          </a:ln>
+        </p:spPr>
+        <p:style>
+          <a:lnRef idx="1">
+            <a:schemeClr val="accent1"/>
+          </a:lnRef>
+          <a:fillRef idx="0">
+            <a:schemeClr val="accent1"/>
+          </a:fillRef>
+          <a:effectRef idx="0">
+            <a:schemeClr val="accent1"/>
+          </a:effectRef>
+          <a:fontRef idx="minor">
+            <a:schemeClr val="tx1"/>
+          </a:fontRef>
+        </p:style>
+      </p:cxnSp>
+      <p:cxnSp>
+        <p:nvCxnSpPr>
+          <p:cNvPr id="42" name="Elbow Connector 41"/>
+          <p:cNvCxnSpPr>
+            <a:stCxn id="3" idx="0"/>
+            <a:endCxn id="28" idx="0"/>
+          </p:cNvCxnSpPr>
+          <p:nvPr/>
+        </p:nvCxnSpPr>
+        <p:spPr>
+          <a:xfrm rot="16200000" flipV="1">
+            <a:off x="5065860" y="1673269"/>
+            <a:ext cx="605372" cy="430446"/>
+          </a:xfrm>
+          <a:prstGeom prst="bentConnector2">
+            <a:avLst/>
+          </a:prstGeom>
+          <a:ln w="28575">
+            <a:solidFill>
+              <a:srgbClr val="0070C0"/>
+            </a:solidFill>
+            <a:prstDash val="sysDot"/>
+            <a:tailEnd type="arrow"/>
           </a:ln>
         </p:spPr>
         <p:style>

</xml_diff>